<commit_message>
Added posterior plots to the presentation
</commit_message>
<xml_diff>
--- a/Presentation.pptx
+++ b/Presentation.pptx
@@ -23,8 +23,6 @@
     <p:sldId id="269" r:id="rId18"/>
     <p:sldId id="270" r:id="rId19"/>
     <p:sldId id="271" r:id="rId20"/>
-    <p:sldId id="272" r:id="rId21"/>
-    <p:sldId id="273" r:id="rId22"/>
   </p:sldIdLst>
   <p:sldSz cx="10080625" cy="7559675"/>
   <p:notesSz cx="7559675" cy="10691812"/>
@@ -5214,7 +5212,34 @@
                 </a:solidFill>
                 <a:latin typeface="Arial"/>
               </a:rPr>
-              <a:t>Click to edit the title text format</a:t>
+              <a:t>Click to </a:t>
+            </a:r>
+            <a:r>
+              <a:rPr b="0" lang="en-US" sz="4400" spc="-1" strike="noStrike">
+                <a:solidFill>
+                  <a:srgbClr val="000000"/>
+                </a:solidFill>
+                <a:latin typeface="Arial"/>
+              </a:rPr>
+              <a:t>edit the </a:t>
+            </a:r>
+            <a:r>
+              <a:rPr b="0" lang="en-US" sz="4400" spc="-1" strike="noStrike">
+                <a:solidFill>
+                  <a:srgbClr val="000000"/>
+                </a:solidFill>
+                <a:latin typeface="Arial"/>
+              </a:rPr>
+              <a:t>title text </a:t>
+            </a:r>
+            <a:r>
+              <a:rPr b="0" lang="en-US" sz="4400" spc="-1" strike="noStrike">
+                <a:solidFill>
+                  <a:srgbClr val="000000"/>
+                </a:solidFill>
+                <a:latin typeface="Arial"/>
+              </a:rPr>
+              <a:t>format</a:t>
             </a:r>
             <a:endParaRPr b="0" lang="en-US" sz="4400" spc="-1" strike="noStrike">
               <a:solidFill>
@@ -6286,7 +6311,7 @@
         <p:spPr>
           <a:xfrm>
             <a:off x="6408000" y="1872000"/>
-            <a:ext cx="3240000" cy="4286160"/>
+            <a:ext cx="3240000" cy="4485960"/>
           </a:xfrm>
           <a:prstGeom prst="rect">
             <a:avLst/>
@@ -6319,23 +6344,19 @@
               <a:rPr b="0" lang="en-AU" sz="1400" spc="-1" strike="noStrike">
                 <a:latin typeface="Arial"/>
               </a:rPr>
-              <a:t>As with the beta model diagnostics we can see that the chains are overlapping which indicates that they have merged well. </a:t>
-            </a:r>
-            <a:endParaRPr b="0" lang="en-AU" sz="1400" spc="-1" strike="noStrike">
-              <a:latin typeface="Arial"/>
-            </a:endParaRPr>
-          </a:p>
-          <a:p>
-            <a:endParaRPr b="0" lang="en-AU" sz="1400" spc="-1" strike="noStrike">
-              <a:latin typeface="Arial"/>
-            </a:endParaRPr>
-          </a:p>
-          <a:p>
+              <a:t>As with the beta model diagnostics we can see that the </a:t>
+            </a:r>
+            <a:r>
+              <a:rPr b="1" lang="en-AU" sz="1400" spc="-1" strike="noStrike">
+                <a:latin typeface="Arial"/>
+              </a:rPr>
+              <a:t>chains are overlapping </a:t>
+            </a:r>
             <a:r>
               <a:rPr b="0" lang="en-AU" sz="1400" spc="-1" strike="noStrike">
                 <a:latin typeface="Arial"/>
               </a:rPr>
-              <a:t>The autocorellation and shrink factor plots both flatten immediately and the effective sample size is very large at 101326. This implies that there is independent information in the chains. </a:t>
+              <a:t>which indicates that they have converged well. </a:t>
             </a:r>
             <a:endParaRPr b="0" lang="en-AU" sz="1400" spc="-1" strike="noStrike">
               <a:latin typeface="Arial"/>
@@ -6351,7 +6372,47 @@
               <a:rPr b="0" lang="en-AU" sz="1400" spc="-1" strike="noStrike">
                 <a:latin typeface="Arial"/>
               </a:rPr>
-              <a:t>The density plot also follows a strong normal bell curve and the MCSE is very small at 0.0539.</a:t>
+              <a:t>The </a:t>
+            </a:r>
+            <a:r>
+              <a:rPr b="1" lang="en-AU" sz="1400" spc="-1" strike="noStrike">
+                <a:latin typeface="Arial"/>
+              </a:rPr>
+              <a:t>autocorellation and shrink factor plots both flatten immediately</a:t>
+            </a:r>
+            <a:r>
+              <a:rPr b="0" lang="en-AU" sz="1400" spc="-1" strike="noStrike">
+                <a:latin typeface="Arial"/>
+              </a:rPr>
+              <a:t> and the effective sample size is very large at 101326. This implies that there is independent information in the chains. </a:t>
+            </a:r>
+            <a:endParaRPr b="0" lang="en-AU" sz="1400" spc="-1" strike="noStrike">
+              <a:latin typeface="Arial"/>
+            </a:endParaRPr>
+          </a:p>
+          <a:p>
+            <a:endParaRPr b="0" lang="en-AU" sz="1400" spc="-1" strike="noStrike">
+              <a:latin typeface="Arial"/>
+            </a:endParaRPr>
+          </a:p>
+          <a:p>
+            <a:r>
+              <a:rPr b="0" lang="en-AU" sz="1400" spc="-1" strike="noStrike">
+                <a:latin typeface="Arial"/>
+              </a:rPr>
+              <a:t>The </a:t>
+            </a:r>
+            <a:r>
+              <a:rPr b="1" lang="en-AU" sz="1400" spc="-1" strike="noStrike">
+                <a:latin typeface="Arial"/>
+              </a:rPr>
+              <a:t>density plot also follows a standard normal distribution</a:t>
+            </a:r>
+            <a:r>
+              <a:rPr b="0" lang="en-AU" sz="1400" spc="-1" strike="noStrike">
+                <a:latin typeface="Arial"/>
+              </a:rPr>
+              <a:t> and the MCSE is very small at 0.0539.</a:t>
             </a:r>
             <a:endParaRPr b="0" lang="en-AU" sz="1400" spc="-1" strike="noStrike">
               <a:latin typeface="Arial"/>
@@ -6488,7 +6549,7 @@
                 <a:latin typeface="Source Sans Pro Black"/>
                 <a:ea typeface="DejaVu Sans"/>
               </a:rPr>
-              <a:t>Posterior Analysis 1</a:t>
+              <a:t>Posterior Analysis</a:t>
             </a:r>
             <a:endParaRPr b="0" lang="en-AU" sz="3200" spc="-1" strike="noStrike">
               <a:latin typeface="Arial"/>
@@ -6521,30 +6582,121 @@
           <a:effectRef idx="0"/>
           <a:fontRef idx="minor"/>
         </p:style>
-        <p:txBody>
-          <a:bodyPr lIns="0" rIns="0" tIns="0" bIns="0">
-            <a:normAutofit/>
-          </a:bodyPr>
-          <a:p>
-            <a:pPr>
-              <a:lnSpc>
-                <a:spcPct val="100000"/>
-              </a:lnSpc>
-              <a:spcAft>
-                <a:spcPts val="1142"/>
-              </a:spcAft>
-            </a:pPr>
-            <a:r>
-              <a:rPr b="1" lang="en-AU" sz="2600" spc="-1" strike="noStrike">
-                <a:solidFill>
-                  <a:srgbClr val="1c1c1c"/>
-                </a:solidFill>
-                <a:latin typeface="Source Sans Pro Semibold"/>
-                <a:ea typeface="DejaVu Sans"/>
-              </a:rPr>
-              <a:t>2 posteriors per slide</a:t>
-            </a:r>
-            <a:endParaRPr b="0" lang="en-AU" sz="2600" spc="-1" strike="noStrike">
+      </p:sp>
+      <p:pic>
+        <p:nvPicPr>
+          <p:cNvPr id="171" name="" descr=""/>
+          <p:cNvPicPr/>
+          <p:nvPr/>
+        </p:nvPicPr>
+        <p:blipFill>
+          <a:blip r:embed="rId1"/>
+          <a:stretch/>
+        </p:blipFill>
+        <p:spPr>
+          <a:xfrm>
+            <a:off x="920520" y="1584000"/>
+            <a:ext cx="3975480" cy="3571200"/>
+          </a:xfrm>
+          <a:prstGeom prst="rect">
+            <a:avLst/>
+          </a:prstGeom>
+          <a:ln>
+            <a:noFill/>
+          </a:ln>
+        </p:spPr>
+      </p:pic>
+      <p:sp>
+        <p:nvSpPr>
+          <p:cNvPr id="172" name="TextShape 3"/>
+          <p:cNvSpPr txBox="1"/>
+          <p:nvPr/>
+        </p:nvSpPr>
+        <p:spPr>
+          <a:xfrm>
+            <a:off x="1080000" y="5112000"/>
+            <a:ext cx="3744000" cy="1626120"/>
+          </a:xfrm>
+          <a:prstGeom prst="rect">
+            <a:avLst/>
+          </a:prstGeom>
+          <a:noFill/>
+          <a:ln>
+            <a:noFill/>
+          </a:ln>
+        </p:spPr>
+        <p:txBody>
+          <a:bodyPr lIns="90000" rIns="90000" tIns="45000" bIns="45000"/>
+          <a:p>
+            <a:r>
+              <a:rPr b="0" lang="en-AU" sz="1800" spc="-1" strike="noStrike">
+                <a:latin typeface="Arial"/>
+              </a:rPr>
+              <a:t>The intercept here has a mode of 6900, with a relatively small HDI range (6200, 7540). This would suggest a high level of confidence in the Intercept value. </a:t>
+            </a:r>
+            <a:endParaRPr b="0" lang="en-AU" sz="1800" spc="-1" strike="noStrike">
+              <a:latin typeface="Arial"/>
+            </a:endParaRPr>
+          </a:p>
+          <a:p>
+            <a:endParaRPr b="0" lang="en-AU" sz="1800" spc="-1" strike="noStrike">
+              <a:latin typeface="Arial"/>
+            </a:endParaRPr>
+          </a:p>
+        </p:txBody>
+      </p:sp>
+      <p:pic>
+        <p:nvPicPr>
+          <p:cNvPr id="173" name="" descr=""/>
+          <p:cNvPicPr/>
+          <p:nvPr/>
+        </p:nvPicPr>
+        <p:blipFill>
+          <a:blip r:embed="rId2"/>
+          <a:stretch/>
+        </p:blipFill>
+        <p:spPr>
+          <a:xfrm>
+            <a:off x="5871600" y="1656000"/>
+            <a:ext cx="3200400" cy="3343680"/>
+          </a:xfrm>
+          <a:prstGeom prst="rect">
+            <a:avLst/>
+          </a:prstGeom>
+          <a:ln>
+            <a:noFill/>
+          </a:ln>
+        </p:spPr>
+      </p:pic>
+      <p:sp>
+        <p:nvSpPr>
+          <p:cNvPr id="174" name="TextShape 4"/>
+          <p:cNvSpPr txBox="1"/>
+          <p:nvPr/>
+        </p:nvSpPr>
+        <p:spPr>
+          <a:xfrm>
+            <a:off x="5328000" y="5112000"/>
+            <a:ext cx="4536000" cy="2138040"/>
+          </a:xfrm>
+          <a:prstGeom prst="rect">
+            <a:avLst/>
+          </a:prstGeom>
+          <a:noFill/>
+          <a:ln>
+            <a:noFill/>
+          </a:ln>
+        </p:spPr>
+        <p:txBody>
+          <a:bodyPr lIns="90000" rIns="90000" tIns="45000" bIns="45000"/>
+          <a:p>
+            <a:r>
+              <a:rPr b="0" lang="en-AU" sz="1800" spc="-1" strike="noStrike">
+                <a:latin typeface="Arial"/>
+              </a:rPr>
+              <a:t>The count variable also has a very small interval suggesting that there is high level of confidence in the mode of -3.75. This figure unexpectedly shows that an increase in one transaction to the total will reduce the average amount spent by $3.75</a:t>
+            </a:r>
+            <a:endParaRPr b="0" lang="en-AU" sz="1800" spc="-1" strike="noStrike">
               <a:latin typeface="Arial"/>
             </a:endParaRPr>
           </a:p>
@@ -6601,7 +6753,7 @@
       </p:grpSpPr>
       <p:sp>
         <p:nvSpPr>
-          <p:cNvPr id="171" name="CustomShape 1"/>
+          <p:cNvPr id="175" name="CustomShape 1"/>
           <p:cNvSpPr/>
           <p:nvPr/>
         </p:nvSpPr>
@@ -6640,7 +6792,7 @@
                 <a:latin typeface="Source Sans Pro Black"/>
                 <a:ea typeface="DejaVu Sans"/>
               </a:rPr>
-              <a:t>Posterior Analysis 2</a:t>
+              <a:t>Posterior Analysis 3</a:t>
             </a:r>
             <a:endParaRPr b="0" lang="en-AU" sz="3200" spc="-1" strike="noStrike">
               <a:latin typeface="Arial"/>
@@ -6650,7 +6802,7 @@
       </p:sp>
       <p:sp>
         <p:nvSpPr>
-          <p:cNvPr id="172" name="CustomShape 2"/>
+          <p:cNvPr id="176" name="CustomShape 2"/>
           <p:cNvSpPr/>
           <p:nvPr/>
         </p:nvSpPr>
@@ -6673,30 +6825,116 @@
           <a:effectRef idx="0"/>
           <a:fontRef idx="minor"/>
         </p:style>
-        <p:txBody>
-          <a:bodyPr lIns="0" rIns="0" tIns="0" bIns="0">
-            <a:normAutofit/>
-          </a:bodyPr>
-          <a:p>
-            <a:pPr>
-              <a:lnSpc>
-                <a:spcPct val="100000"/>
-              </a:lnSpc>
-              <a:spcAft>
-                <a:spcPts val="1142"/>
-              </a:spcAft>
-            </a:pPr>
-            <a:r>
-              <a:rPr b="1" lang="en-AU" sz="2600" spc="-1" strike="noStrike">
-                <a:solidFill>
-                  <a:srgbClr val="1c1c1c"/>
-                </a:solidFill>
-                <a:latin typeface="Source Sans Pro Semibold"/>
-                <a:ea typeface="DejaVu Sans"/>
-              </a:rPr>
-              <a:t>2 posteriors per slide</a:t>
-            </a:r>
-            <a:endParaRPr b="0" lang="en-AU" sz="2600" spc="-1" strike="noStrike">
+      </p:sp>
+      <p:pic>
+        <p:nvPicPr>
+          <p:cNvPr id="177" name="" descr=""/>
+          <p:cNvPicPr/>
+          <p:nvPr/>
+        </p:nvPicPr>
+        <p:blipFill>
+          <a:blip r:embed="rId1"/>
+          <a:stretch/>
+        </p:blipFill>
+        <p:spPr>
+          <a:xfrm>
+            <a:off x="830880" y="1584000"/>
+            <a:ext cx="3201120" cy="3449160"/>
+          </a:xfrm>
+          <a:prstGeom prst="rect">
+            <a:avLst/>
+          </a:prstGeom>
+          <a:ln>
+            <a:noFill/>
+          </a:ln>
+        </p:spPr>
+      </p:pic>
+      <p:sp>
+        <p:nvSpPr>
+          <p:cNvPr id="178" name="TextShape 3"/>
+          <p:cNvSpPr txBox="1"/>
+          <p:nvPr/>
+        </p:nvSpPr>
+        <p:spPr>
+          <a:xfrm>
+            <a:off x="830880" y="5033160"/>
+            <a:ext cx="3777120" cy="1882080"/>
+          </a:xfrm>
+          <a:prstGeom prst="rect">
+            <a:avLst/>
+          </a:prstGeom>
+          <a:noFill/>
+          <a:ln>
+            <a:noFill/>
+          </a:ln>
+        </p:spPr>
+        <p:txBody>
+          <a:bodyPr lIns="90000" rIns="90000" tIns="45000" bIns="45000"/>
+          <a:p>
+            <a:r>
+              <a:rPr b="0" lang="en-AU" sz="1800" spc="-1" strike="noStrike">
+                <a:latin typeface="Arial"/>
+              </a:rPr>
+              <a:t>Beta 2 here shows that being Male will increase the average amount spend by $1950. This average increase should be given a high level of confidence due to the small associated interval</a:t>
+            </a:r>
+            <a:endParaRPr b="0" lang="en-AU" sz="1800" spc="-1" strike="noStrike">
+              <a:latin typeface="Arial"/>
+            </a:endParaRPr>
+          </a:p>
+        </p:txBody>
+      </p:sp>
+      <p:pic>
+        <p:nvPicPr>
+          <p:cNvPr id="179" name="" descr=""/>
+          <p:cNvPicPr/>
+          <p:nvPr/>
+        </p:nvPicPr>
+        <p:blipFill>
+          <a:blip r:embed="rId2"/>
+          <a:stretch/>
+        </p:blipFill>
+        <p:spPr>
+          <a:xfrm>
+            <a:off x="4896000" y="1439280"/>
+            <a:ext cx="3672000" cy="3508920"/>
+          </a:xfrm>
+          <a:prstGeom prst="rect">
+            <a:avLst/>
+          </a:prstGeom>
+          <a:ln>
+            <a:noFill/>
+          </a:ln>
+        </p:spPr>
+      </p:pic>
+      <p:sp>
+        <p:nvSpPr>
+          <p:cNvPr id="180" name="TextShape 4"/>
+          <p:cNvSpPr txBox="1"/>
+          <p:nvPr/>
+        </p:nvSpPr>
+        <p:spPr>
+          <a:xfrm>
+            <a:off x="4896000" y="4948200"/>
+            <a:ext cx="4680000" cy="2138040"/>
+          </a:xfrm>
+          <a:prstGeom prst="rect">
+            <a:avLst/>
+          </a:prstGeom>
+          <a:noFill/>
+          <a:ln>
+            <a:noFill/>
+          </a:ln>
+        </p:spPr>
+        <p:txBody>
+          <a:bodyPr lIns="90000" rIns="90000" tIns="45000" bIns="45000"/>
+          <a:p>
+            <a:r>
+              <a:rPr b="0" lang="en-AU" sz="1800" spc="-1" strike="noStrike">
+                <a:latin typeface="Arial"/>
+              </a:rPr>
+              <a:t>Beta 3 is an example of the age bracket variables within the black friday dataset. Unlike the previously seen posterior plots, beta 3 has a relatively low level of confidence associated with it. This is seen in all of the age variables with the mode increasing as the age bracket increases</a:t>
+            </a:r>
+            <a:endParaRPr b="0" lang="en-AU" sz="1800" spc="-1" strike="noStrike">
               <a:latin typeface="Arial"/>
             </a:endParaRPr>
           </a:p>
@@ -6753,7 +6991,7 @@
       </p:grpSpPr>
       <p:sp>
         <p:nvSpPr>
-          <p:cNvPr id="173" name="CustomShape 1"/>
+          <p:cNvPr id="181" name="CustomShape 1"/>
           <p:cNvSpPr/>
           <p:nvPr/>
         </p:nvSpPr>
@@ -6792,7 +7030,7 @@
                 <a:latin typeface="Source Sans Pro Black"/>
                 <a:ea typeface="DejaVu Sans"/>
               </a:rPr>
-              <a:t>Posterior Analysis 3</a:t>
+              <a:t>Predictions</a:t>
             </a:r>
             <a:endParaRPr b="0" lang="en-AU" sz="3200" spc="-1" strike="noStrike">
               <a:latin typeface="Arial"/>
@@ -6802,7 +7040,7 @@
       </p:sp>
       <p:sp>
         <p:nvSpPr>
-          <p:cNvPr id="174" name="CustomShape 2"/>
+          <p:cNvPr id="182" name="CustomShape 2"/>
           <p:cNvSpPr/>
           <p:nvPr/>
         </p:nvSpPr>
@@ -6825,34 +7063,6 @@
           <a:effectRef idx="0"/>
           <a:fontRef idx="minor"/>
         </p:style>
-        <p:txBody>
-          <a:bodyPr lIns="0" rIns="0" tIns="0" bIns="0">
-            <a:normAutofit/>
-          </a:bodyPr>
-          <a:p>
-            <a:pPr>
-              <a:lnSpc>
-                <a:spcPct val="100000"/>
-              </a:lnSpc>
-              <a:spcAft>
-                <a:spcPts val="1142"/>
-              </a:spcAft>
-            </a:pPr>
-            <a:r>
-              <a:rPr b="1" lang="en-AU" sz="2600" spc="-1" strike="noStrike">
-                <a:solidFill>
-                  <a:srgbClr val="1c1c1c"/>
-                </a:solidFill>
-                <a:latin typeface="Source Sans Pro Semibold"/>
-                <a:ea typeface="DejaVu Sans"/>
-              </a:rPr>
-              <a:t>2 posteriors per slide</a:t>
-            </a:r>
-            <a:endParaRPr b="0" lang="en-AU" sz="2600" spc="-1" strike="noStrike">
-              <a:latin typeface="Arial"/>
-            </a:endParaRPr>
-          </a:p>
-        </p:txBody>
       </p:sp>
     </p:spTree>
   </p:cSld>
@@ -6905,7 +7115,7 @@
       </p:grpSpPr>
       <p:sp>
         <p:nvSpPr>
-          <p:cNvPr id="175" name="CustomShape 1"/>
+          <p:cNvPr id="183" name="CustomShape 1"/>
           <p:cNvSpPr/>
           <p:nvPr/>
         </p:nvSpPr>
@@ -6944,7 +7154,7 @@
                 <a:latin typeface="Source Sans Pro Black"/>
                 <a:ea typeface="DejaVu Sans"/>
               </a:rPr>
-              <a:t>Posterior Analysis 4</a:t>
+              <a:t>Summary</a:t>
             </a:r>
             <a:endParaRPr b="0" lang="en-AU" sz="3200" spc="-1" strike="noStrike">
               <a:latin typeface="Arial"/>
@@ -6954,7 +7164,7 @@
       </p:sp>
       <p:sp>
         <p:nvSpPr>
-          <p:cNvPr id="176" name="CustomShape 2"/>
+          <p:cNvPr id="184" name="CustomShape 2"/>
           <p:cNvSpPr/>
           <p:nvPr/>
         </p:nvSpPr>
@@ -6977,34 +7187,6 @@
           <a:effectRef idx="0"/>
           <a:fontRef idx="minor"/>
         </p:style>
-        <p:txBody>
-          <a:bodyPr lIns="0" rIns="0" tIns="0" bIns="0">
-            <a:normAutofit/>
-          </a:bodyPr>
-          <a:p>
-            <a:pPr>
-              <a:lnSpc>
-                <a:spcPct val="100000"/>
-              </a:lnSpc>
-              <a:spcAft>
-                <a:spcPts val="1142"/>
-              </a:spcAft>
-            </a:pPr>
-            <a:r>
-              <a:rPr b="1" lang="en-AU" sz="2600" spc="-1" strike="noStrike">
-                <a:solidFill>
-                  <a:srgbClr val="1c1c1c"/>
-                </a:solidFill>
-                <a:latin typeface="Source Sans Pro Semibold"/>
-                <a:ea typeface="DejaVu Sans"/>
-              </a:rPr>
-              <a:t>2 posteriors per slide</a:t>
-            </a:r>
-            <a:endParaRPr b="0" lang="en-AU" sz="2600" spc="-1" strike="noStrike">
-              <a:latin typeface="Arial"/>
-            </a:endParaRPr>
-          </a:p>
-        </p:txBody>
       </p:sp>
     </p:spTree>
   </p:cSld>
@@ -7015,254 +7197,6 @@
           <p:childTnLst>
             <p:seq>
               <p:cTn id="32" nodeType="mainSeq"/>
-              <p:prevCondLst>
-                <p:cond delay="0" evt="onPrev">
-                  <p:tgtEl>
-                    <p:sldTgt/>
-                  </p:tgtEl>
-                </p:cond>
-              </p:prevCondLst>
-              <p:nextCondLst>
-                <p:cond delay="0" evt="onNext">
-                  <p:tgtEl>
-                    <p:sldTgt/>
-                  </p:tgtEl>
-                </p:cond>
-              </p:nextCondLst>
-            </p:seq>
-          </p:childTnLst>
-        </p:cTn>
-      </p:par>
-    </p:tnLst>
-  </p:timing>
-</p:sld>
-</file>
-
-<file path=ppt/slides/slide17.xml><?xml version="1.0" encoding="utf-8"?>
-<p:sld xmlns:a="http://schemas.openxmlformats.org/drawingml/2006/main" xmlns:p="http://schemas.openxmlformats.org/presentationml/2006/main" xmlns:r="http://schemas.openxmlformats.org/officeDocument/2006/relationships" xmlns:p14="http://schemas.microsoft.com/office/powerpoint/2010/main" xmlns:p15="http://schemas.microsoft.com/office/powerpoint/2012/main" xmlns:mc="http://schemas.openxmlformats.org/markup-compatibility/2006">
-  <p:cSld>
-    <p:spTree>
-      <p:nvGrpSpPr>
-        <p:cNvPr id="1" name=""/>
-        <p:cNvGrpSpPr/>
-        <p:nvPr/>
-      </p:nvGrpSpPr>
-      <p:grpSpPr>
-        <a:xfrm>
-          <a:off x="0" y="0"/>
-          <a:ext cx="0" cy="0"/>
-          <a:chOff x="0" y="0"/>
-          <a:chExt cx="0" cy="0"/>
-        </a:xfrm>
-      </p:grpSpPr>
-      <p:sp>
-        <p:nvSpPr>
-          <p:cNvPr id="177" name="CustomShape 1"/>
-          <p:cNvSpPr/>
-          <p:nvPr/>
-        </p:nvSpPr>
-        <p:spPr>
-          <a:xfrm>
-            <a:off x="360000" y="360000"/>
-            <a:ext cx="9359280" cy="899280"/>
-          </a:xfrm>
-          <a:prstGeom prst="rect">
-            <a:avLst/>
-          </a:prstGeom>
-          <a:noFill/>
-          <a:ln>
-            <a:noFill/>
-          </a:ln>
-        </p:spPr>
-        <p:style>
-          <a:lnRef idx="0"/>
-          <a:fillRef idx="0"/>
-          <a:effectRef idx="0"/>
-          <a:fontRef idx="minor"/>
-        </p:style>
-        <p:txBody>
-          <a:bodyPr lIns="0" rIns="0" tIns="0" bIns="0" anchor="b"/>
-          <a:p>
-            <a:pPr>
-              <a:lnSpc>
-                <a:spcPct val="100000"/>
-              </a:lnSpc>
-            </a:pPr>
-            <a:r>
-              <a:rPr b="1" lang="en-AU" sz="3200" spc="-1" strike="noStrike">
-                <a:solidFill>
-                  <a:srgbClr val="ffffff"/>
-                </a:solidFill>
-                <a:latin typeface="Source Sans Pro Black"/>
-                <a:ea typeface="DejaVu Sans"/>
-              </a:rPr>
-              <a:t>Predictions</a:t>
-            </a:r>
-            <a:endParaRPr b="0" lang="en-AU" sz="3200" spc="-1" strike="noStrike">
-              <a:latin typeface="Arial"/>
-            </a:endParaRPr>
-          </a:p>
-        </p:txBody>
-      </p:sp>
-      <p:sp>
-        <p:nvSpPr>
-          <p:cNvPr id="178" name="CustomShape 2"/>
-          <p:cNvSpPr/>
-          <p:nvPr/>
-        </p:nvSpPr>
-        <p:spPr>
-          <a:xfrm>
-            <a:off x="360000" y="1980000"/>
-            <a:ext cx="9179280" cy="4679280"/>
-          </a:xfrm>
-          <a:prstGeom prst="rect">
-            <a:avLst/>
-          </a:prstGeom>
-          <a:noFill/>
-          <a:ln>
-            <a:noFill/>
-          </a:ln>
-        </p:spPr>
-        <p:style>
-          <a:lnRef idx="0"/>
-          <a:fillRef idx="0"/>
-          <a:effectRef idx="0"/>
-          <a:fontRef idx="minor"/>
-        </p:style>
-      </p:sp>
-    </p:spTree>
-  </p:cSld>
-  <p:timing>
-    <p:tnLst>
-      <p:par>
-        <p:cTn id="33" dur="indefinite" restart="never" nodeType="tmRoot">
-          <p:childTnLst>
-            <p:seq>
-              <p:cTn id="34" nodeType="mainSeq"/>
-              <p:prevCondLst>
-                <p:cond delay="0" evt="onPrev">
-                  <p:tgtEl>
-                    <p:sldTgt/>
-                  </p:tgtEl>
-                </p:cond>
-              </p:prevCondLst>
-              <p:nextCondLst>
-                <p:cond delay="0" evt="onNext">
-                  <p:tgtEl>
-                    <p:sldTgt/>
-                  </p:tgtEl>
-                </p:cond>
-              </p:nextCondLst>
-            </p:seq>
-          </p:childTnLst>
-        </p:cTn>
-      </p:par>
-    </p:tnLst>
-  </p:timing>
-</p:sld>
-</file>
-
-<file path=ppt/slides/slide18.xml><?xml version="1.0" encoding="utf-8"?>
-<p:sld xmlns:a="http://schemas.openxmlformats.org/drawingml/2006/main" xmlns:p="http://schemas.openxmlformats.org/presentationml/2006/main" xmlns:r="http://schemas.openxmlformats.org/officeDocument/2006/relationships" xmlns:p14="http://schemas.microsoft.com/office/powerpoint/2010/main" xmlns:p15="http://schemas.microsoft.com/office/powerpoint/2012/main" xmlns:mc="http://schemas.openxmlformats.org/markup-compatibility/2006">
-  <p:cSld>
-    <p:spTree>
-      <p:nvGrpSpPr>
-        <p:cNvPr id="1" name=""/>
-        <p:cNvGrpSpPr/>
-        <p:nvPr/>
-      </p:nvGrpSpPr>
-      <p:grpSpPr>
-        <a:xfrm>
-          <a:off x="0" y="0"/>
-          <a:ext cx="0" cy="0"/>
-          <a:chOff x="0" y="0"/>
-          <a:chExt cx="0" cy="0"/>
-        </a:xfrm>
-      </p:grpSpPr>
-      <p:sp>
-        <p:nvSpPr>
-          <p:cNvPr id="179" name="CustomShape 1"/>
-          <p:cNvSpPr/>
-          <p:nvPr/>
-        </p:nvSpPr>
-        <p:spPr>
-          <a:xfrm>
-            <a:off x="360000" y="360000"/>
-            <a:ext cx="9359280" cy="899280"/>
-          </a:xfrm>
-          <a:prstGeom prst="rect">
-            <a:avLst/>
-          </a:prstGeom>
-          <a:noFill/>
-          <a:ln>
-            <a:noFill/>
-          </a:ln>
-        </p:spPr>
-        <p:style>
-          <a:lnRef idx="0"/>
-          <a:fillRef idx="0"/>
-          <a:effectRef idx="0"/>
-          <a:fontRef idx="minor"/>
-        </p:style>
-        <p:txBody>
-          <a:bodyPr lIns="0" rIns="0" tIns="0" bIns="0" anchor="b"/>
-          <a:p>
-            <a:pPr>
-              <a:lnSpc>
-                <a:spcPct val="100000"/>
-              </a:lnSpc>
-            </a:pPr>
-            <a:r>
-              <a:rPr b="1" lang="en-AU" sz="3200" spc="-1" strike="noStrike">
-                <a:solidFill>
-                  <a:srgbClr val="ffffff"/>
-                </a:solidFill>
-                <a:latin typeface="Source Sans Pro Black"/>
-                <a:ea typeface="DejaVu Sans"/>
-              </a:rPr>
-              <a:t>Summary</a:t>
-            </a:r>
-            <a:endParaRPr b="0" lang="en-AU" sz="3200" spc="-1" strike="noStrike">
-              <a:latin typeface="Arial"/>
-            </a:endParaRPr>
-          </a:p>
-        </p:txBody>
-      </p:sp>
-      <p:sp>
-        <p:nvSpPr>
-          <p:cNvPr id="180" name="CustomShape 2"/>
-          <p:cNvSpPr/>
-          <p:nvPr/>
-        </p:nvSpPr>
-        <p:spPr>
-          <a:xfrm>
-            <a:off x="360000" y="1980000"/>
-            <a:ext cx="9179280" cy="4679280"/>
-          </a:xfrm>
-          <a:prstGeom prst="rect">
-            <a:avLst/>
-          </a:prstGeom>
-          <a:noFill/>
-          <a:ln>
-            <a:noFill/>
-          </a:ln>
-        </p:spPr>
-        <p:style>
-          <a:lnRef idx="0"/>
-          <a:fillRef idx="0"/>
-          <a:effectRef idx="0"/>
-          <a:fontRef idx="minor"/>
-        </p:style>
-      </p:sp>
-    </p:spTree>
-  </p:cSld>
-  <p:timing>
-    <p:tnLst>
-      <p:par>
-        <p:cTn id="35" dur="indefinite" restart="never" nodeType="tmRoot">
-          <p:childTnLst>
-            <p:seq>
-              <p:cTn id="36" nodeType="mainSeq"/>
               <p:prevCondLst>
                 <p:cond delay="0" evt="onPrev">
                   <p:tgtEl>

</xml_diff>

<commit_message>
Removed number from title page of posterior analysis
</commit_message>
<xml_diff>
--- a/Presentation.pptx
+++ b/Presentation.pptx
@@ -4382,7 +4382,16 @@
                 </a:solidFill>
                 <a:latin typeface="Arial"/>
               </a:rPr>
-              <a:t>Click to edit the title text format</a:t>
+              <a:t>Click to edit the </a:t>
+            </a:r>
+            <a:r>
+              <a:rPr b="0" lang="en-US" sz="4400" spc="-1" strike="noStrike">
+                <a:solidFill>
+                  <a:srgbClr val="000000"/>
+                </a:solidFill>
+                <a:latin typeface="Arial"/>
+              </a:rPr>
+              <a:t>title text format</a:t>
             </a:r>
             <a:endParaRPr b="0" lang="en-US" sz="4400" spc="-1" strike="noStrike">
               <a:solidFill>
@@ -5212,34 +5221,7 @@
                 </a:solidFill>
                 <a:latin typeface="Arial"/>
               </a:rPr>
-              <a:t>Click to </a:t>
-            </a:r>
-            <a:r>
-              <a:rPr b="0" lang="en-US" sz="4400" spc="-1" strike="noStrike">
-                <a:solidFill>
-                  <a:srgbClr val="000000"/>
-                </a:solidFill>
-                <a:latin typeface="Arial"/>
-              </a:rPr>
-              <a:t>edit the </a:t>
-            </a:r>
-            <a:r>
-              <a:rPr b="0" lang="en-US" sz="4400" spc="-1" strike="noStrike">
-                <a:solidFill>
-                  <a:srgbClr val="000000"/>
-                </a:solidFill>
-                <a:latin typeface="Arial"/>
-              </a:rPr>
-              <a:t>title text </a:t>
-            </a:r>
-            <a:r>
-              <a:rPr b="0" lang="en-US" sz="4400" spc="-1" strike="noStrike">
-                <a:solidFill>
-                  <a:srgbClr val="000000"/>
-                </a:solidFill>
-                <a:latin typeface="Arial"/>
-              </a:rPr>
-              <a:t>format</a:t>
+              <a:t>Click to edit the title text format</a:t>
             </a:r>
             <a:endParaRPr b="0" lang="en-US" sz="4400" spc="-1" strike="noStrike">
               <a:solidFill>
@@ -6792,7 +6774,7 @@
                 <a:latin typeface="Source Sans Pro Black"/>
                 <a:ea typeface="DejaVu Sans"/>
               </a:rPr>
-              <a:t>Posterior Analysis 3</a:t>
+              <a:t>Posterior Analysis</a:t>
             </a:r>
             <a:endParaRPr b="0" lang="en-AU" sz="3200" spc="-1" strike="noStrike">
               <a:latin typeface="Arial"/>

</xml_diff>